<commit_message>
content changed in communication slide
</commit_message>
<xml_diff>
--- a/Cloud Box_ppt.pptx
+++ b/Cloud Box_ppt.pptx
@@ -182,37 +182,37 @@
               <c:formatCode>#,##0_ "hrs"</c:formatCode>
               <c:ptCount val="11"/>
               <c:pt idx="0">
-                <c:v>0</c:v>
+                <c:v>0.0</c:v>
               </c:pt>
               <c:pt idx="1">
-                <c:v>0</c:v>
+                <c:v>0.0</c:v>
               </c:pt>
               <c:pt idx="2">
-                <c:v>124</c:v>
+                <c:v>124.0</c:v>
               </c:pt>
               <c:pt idx="3">
-                <c:v>120</c:v>
+                <c:v>120.0</c:v>
               </c:pt>
               <c:pt idx="4">
-                <c:v>0</c:v>
+                <c:v>0.0</c:v>
               </c:pt>
               <c:pt idx="5">
-                <c:v>0</c:v>
+                <c:v>0.0</c:v>
               </c:pt>
               <c:pt idx="6">
-                <c:v>0</c:v>
+                <c:v>0.0</c:v>
               </c:pt>
               <c:pt idx="7">
-                <c:v>0</c:v>
+                <c:v>0.0</c:v>
               </c:pt>
               <c:pt idx="8">
-                <c:v>0</c:v>
+                <c:v>0.0</c:v>
               </c:pt>
               <c:pt idx="9">
-                <c:v>32</c:v>
+                <c:v>32.0</c:v>
               </c:pt>
               <c:pt idx="10">
-                <c:v>16</c:v>
+                <c:v>16.0</c:v>
               </c:pt>
             </c:numLit>
           </c:val>
@@ -255,37 +255,37 @@
               <c:formatCode>#,##0_ "hrs"</c:formatCode>
               <c:ptCount val="11"/>
               <c:pt idx="0">
-                <c:v>0</c:v>
+                <c:v>0.0</c:v>
               </c:pt>
               <c:pt idx="1">
-                <c:v>0</c:v>
+                <c:v>0.0</c:v>
               </c:pt>
               <c:pt idx="2">
-                <c:v>288.63333333333338</c:v>
+                <c:v>288.6333333333334</c:v>
               </c:pt>
               <c:pt idx="3">
-                <c:v>265.63333333333338</c:v>
+                <c:v>265.6333333333334</c:v>
               </c:pt>
               <c:pt idx="4">
-                <c:v>0</c:v>
+                <c:v>0.0</c:v>
               </c:pt>
               <c:pt idx="5">
-                <c:v>0</c:v>
+                <c:v>0.0</c:v>
               </c:pt>
               <c:pt idx="6">
-                <c:v>0</c:v>
+                <c:v>0.0</c:v>
               </c:pt>
               <c:pt idx="7">
-                <c:v>0</c:v>
+                <c:v>0.0</c:v>
               </c:pt>
               <c:pt idx="8">
-                <c:v>0</c:v>
+                <c:v>0.0</c:v>
               </c:pt>
               <c:pt idx="9">
-                <c:v>276.63333333333338</c:v>
+                <c:v>276.6333333333334</c:v>
               </c:pt>
               <c:pt idx="10">
-                <c:v>292.63333333333338</c:v>
+                <c:v>292.6333333333334</c:v>
               </c:pt>
             </c:numLit>
           </c:val>
@@ -300,8 +300,8 @@
         </c:dLbls>
         <c:gapWidth val="219"/>
         <c:overlap val="100"/>
-        <c:axId val="68019328"/>
-        <c:axId val="68021248"/>
+        <c:axId val="2129618632"/>
+        <c:axId val="2129621832"/>
       </c:barChart>
       <c:lineChart>
         <c:grouping val="standard"/>
@@ -358,37 +358,37 @@
               <c:formatCode>#,##0_ "hrs"</c:formatCode>
               <c:ptCount val="11"/>
               <c:pt idx="0">
-                <c:v>0</c:v>
+                <c:v>0.0</c:v>
               </c:pt>
               <c:pt idx="1">
-                <c:v>0</c:v>
+                <c:v>0.0</c:v>
               </c:pt>
               <c:pt idx="2">
-                <c:v>0</c:v>
+                <c:v>0.0</c:v>
               </c:pt>
               <c:pt idx="3">
-                <c:v>0</c:v>
+                <c:v>0.0</c:v>
               </c:pt>
               <c:pt idx="4">
-                <c:v>0</c:v>
+                <c:v>0.0</c:v>
               </c:pt>
               <c:pt idx="5">
-                <c:v>0</c:v>
+                <c:v>0.0</c:v>
               </c:pt>
               <c:pt idx="6">
-                <c:v>0</c:v>
+                <c:v>0.0</c:v>
               </c:pt>
               <c:pt idx="7">
-                <c:v>0</c:v>
+                <c:v>0.0</c:v>
               </c:pt>
               <c:pt idx="8">
-                <c:v>0</c:v>
+                <c:v>0.0</c:v>
               </c:pt>
               <c:pt idx="9">
-                <c:v>0</c:v>
+                <c:v>0.0</c:v>
               </c:pt>
               <c:pt idx="10">
-                <c:v>0</c:v>
+                <c:v>0.0</c:v>
               </c:pt>
             </c:numLit>
           </c:val>
@@ -404,11 +404,11 @@
         </c:dLbls>
         <c:marker val="1"/>
         <c:smooth val="0"/>
-        <c:axId val="68019328"/>
-        <c:axId val="68021248"/>
+        <c:axId val="2129618632"/>
+        <c:axId val="2129621832"/>
       </c:lineChart>
       <c:catAx>
-        <c:axId val="68019328"/>
+        <c:axId val="2129618632"/>
         <c:scaling>
           <c:orientation val="minMax"/>
         </c:scaling>
@@ -451,7 +451,7 @@
             <a:endParaRPr lang="en-US"/>
           </a:p>
         </c:txPr>
-        <c:crossAx val="68021248"/>
+        <c:crossAx val="2129621832"/>
         <c:crosses val="autoZero"/>
         <c:auto val="1"/>
         <c:lblAlgn val="ctr"/>
@@ -459,7 +459,7 @@
         <c:noMultiLvlLbl val="0"/>
       </c:catAx>
       <c:valAx>
-        <c:axId val="68021248"/>
+        <c:axId val="2129621832"/>
         <c:scaling>
           <c:orientation val="minMax"/>
         </c:scaling>
@@ -510,7 +510,7 @@
             <a:endParaRPr lang="en-US"/>
           </a:p>
         </c:txPr>
-        <c:crossAx val="68019328"/>
+        <c:crossAx val="2129618632"/>
         <c:crosses val="autoZero"/>
         <c:crossBetween val="between"/>
       </c:valAx>
@@ -672,7 +672,7 @@
           <a:p>
             <a:fld id="{95BF0C08-FCD6-43F3-82F6-83D8E9FE6A7C}" type="datetimeFigureOut">
               <a:rPr lang="en-US" smtClean="0"/>
-              <a:t>7/9/2014</a:t>
+              <a:t>2014-07-09</a:t>
             </a:fld>
             <a:endParaRPr lang="en-US"/>
           </a:p>
@@ -1362,7 +1362,7 @@
           <a:p>
             <a:fld id="{98F748B1-DC6F-4870-8D1C-AA1B251EDBCA}" type="datetimeFigureOut">
               <a:rPr lang="en-CA" smtClean="0"/>
-              <a:t>09/07/2014</a:t>
+              <a:t>2014-07-09</a:t>
             </a:fld>
             <a:endParaRPr lang="en-CA"/>
           </a:p>
@@ -1453,7 +1453,7 @@
   <p:timing>
     <p:tnLst>
       <p:par>
-        <p:cTn id="1" dur="indefinite" restart="never" nodeType="tmRoot"/>
+        <p:cTn xmlns:p14="http://schemas.microsoft.com/office/powerpoint/2010/main" id="1" dur="indefinite" restart="never" nodeType="tmRoot"/>
       </p:par>
     </p:tnLst>
   </p:timing>
@@ -1574,7 +1574,7 @@
           <a:p>
             <a:fld id="{98F748B1-DC6F-4870-8D1C-AA1B251EDBCA}" type="datetimeFigureOut">
               <a:rPr lang="en-CA" smtClean="0"/>
-              <a:t>09/07/2014</a:t>
+              <a:t>2014-07-09</a:t>
             </a:fld>
             <a:endParaRPr lang="en-CA"/>
           </a:p>
@@ -1630,7 +1630,7 @@
   <p:timing>
     <p:tnLst>
       <p:par>
-        <p:cTn id="1" dur="indefinite" restart="never" nodeType="tmRoot"/>
+        <p:cTn xmlns:p14="http://schemas.microsoft.com/office/powerpoint/2010/main" id="1" dur="indefinite" restart="never" nodeType="tmRoot"/>
       </p:par>
     </p:tnLst>
   </p:timing>
@@ -1761,7 +1761,7 @@
           <a:p>
             <a:fld id="{98F748B1-DC6F-4870-8D1C-AA1B251EDBCA}" type="datetimeFigureOut">
               <a:rPr lang="en-CA" smtClean="0"/>
-              <a:t>09/07/2014</a:t>
+              <a:t>2014-07-09</a:t>
             </a:fld>
             <a:endParaRPr lang="en-CA"/>
           </a:p>
@@ -1817,7 +1817,7 @@
   <p:timing>
     <p:tnLst>
       <p:par>
-        <p:cTn id="1" dur="indefinite" restart="never" nodeType="tmRoot"/>
+        <p:cTn xmlns:p14="http://schemas.microsoft.com/office/powerpoint/2010/main" id="1" dur="indefinite" restart="never" nodeType="tmRoot"/>
       </p:par>
     </p:tnLst>
   </p:timing>
@@ -1858,7 +1858,7 @@
           <a:p>
             <a:fld id="{98F748B1-DC6F-4870-8D1C-AA1B251EDBCA}" type="datetimeFigureOut">
               <a:rPr lang="en-CA" smtClean="0"/>
-              <a:t>09/07/2014</a:t>
+              <a:t>2014-07-09</a:t>
             </a:fld>
             <a:endParaRPr lang="en-CA"/>
           </a:p>
@@ -1994,7 +1994,7 @@
   <p:timing>
     <p:tnLst>
       <p:par>
-        <p:cTn id="1" dur="indefinite" restart="never" nodeType="tmRoot"/>
+        <p:cTn xmlns:p14="http://schemas.microsoft.com/office/powerpoint/2010/main" id="1" dur="indefinite" restart="never" nodeType="tmRoot"/>
       </p:par>
     </p:tnLst>
   </p:timing>
@@ -2454,7 +2454,7 @@
           <a:p>
             <a:fld id="{98F748B1-DC6F-4870-8D1C-AA1B251EDBCA}" type="datetimeFigureOut">
               <a:rPr lang="en-CA" smtClean="0"/>
-              <a:t>09/07/2014</a:t>
+              <a:t>2014-07-09</a:t>
             </a:fld>
             <a:endParaRPr lang="en-CA"/>
           </a:p>
@@ -2510,7 +2510,7 @@
   <p:timing>
     <p:tnLst>
       <p:par>
-        <p:cTn id="1" dur="indefinite" restart="never" nodeType="tmRoot"/>
+        <p:cTn xmlns:p14="http://schemas.microsoft.com/office/powerpoint/2010/main" id="1" dur="indefinite" restart="never" nodeType="tmRoot"/>
       </p:par>
     </p:tnLst>
   </p:timing>
@@ -2551,7 +2551,7 @@
           <a:p>
             <a:fld id="{98F748B1-DC6F-4870-8D1C-AA1B251EDBCA}" type="datetimeFigureOut">
               <a:rPr lang="en-CA" smtClean="0"/>
-              <a:t>09/07/2014</a:t>
+              <a:t>2014-07-09</a:t>
             </a:fld>
             <a:endParaRPr lang="en-CA"/>
           </a:p>
@@ -2744,7 +2744,7 @@
   <p:timing>
     <p:tnLst>
       <p:par>
-        <p:cTn id="1" dur="indefinite" restart="never" nodeType="tmRoot"/>
+        <p:cTn xmlns:p14="http://schemas.microsoft.com/office/powerpoint/2010/main" id="1" dur="indefinite" restart="never" nodeType="tmRoot"/>
       </p:par>
     </p:tnLst>
   </p:timing>
@@ -3156,7 +3156,7 @@
           <a:p>
             <a:fld id="{98F748B1-DC6F-4870-8D1C-AA1B251EDBCA}" type="datetimeFigureOut">
               <a:rPr lang="en-CA" smtClean="0"/>
-              <a:t>09/07/2014</a:t>
+              <a:t>2014-07-09</a:t>
             </a:fld>
             <a:endParaRPr lang="en-CA"/>
           </a:p>
@@ -3235,7 +3235,7 @@
   <p:timing>
     <p:tnLst>
       <p:par>
-        <p:cTn id="1" dur="indefinite" restart="never" nodeType="tmRoot"/>
+        <p:cTn xmlns:p14="http://schemas.microsoft.com/office/powerpoint/2010/main" id="1" dur="indefinite" restart="never" nodeType="tmRoot"/>
       </p:par>
     </p:tnLst>
   </p:timing>
@@ -3299,7 +3299,7 @@
           <a:p>
             <a:fld id="{98F748B1-DC6F-4870-8D1C-AA1B251EDBCA}" type="datetimeFigureOut">
               <a:rPr lang="en-CA" smtClean="0"/>
-              <a:t>09/07/2014</a:t>
+              <a:t>2014-07-09</a:t>
             </a:fld>
             <a:endParaRPr lang="en-CA"/>
           </a:p>
@@ -3355,7 +3355,7 @@
   <p:timing>
     <p:tnLst>
       <p:par>
-        <p:cTn id="1" dur="indefinite" restart="never" nodeType="tmRoot"/>
+        <p:cTn xmlns:p14="http://schemas.microsoft.com/office/powerpoint/2010/main" id="1" dur="indefinite" restart="never" nodeType="tmRoot"/>
       </p:par>
     </p:tnLst>
   </p:timing>
@@ -3396,7 +3396,7 @@
           <a:p>
             <a:fld id="{98F748B1-DC6F-4870-8D1C-AA1B251EDBCA}" type="datetimeFigureOut">
               <a:rPr lang="en-CA" smtClean="0"/>
-              <a:t>09/07/2014</a:t>
+              <a:t>2014-07-09</a:t>
             </a:fld>
             <a:endParaRPr lang="en-CA"/>
           </a:p>
@@ -3452,7 +3452,7 @@
   <p:timing>
     <p:tnLst>
       <p:par>
-        <p:cTn id="1" dur="indefinite" restart="never" nodeType="tmRoot"/>
+        <p:cTn xmlns:p14="http://schemas.microsoft.com/office/powerpoint/2010/main" id="1" dur="indefinite" restart="never" nodeType="tmRoot"/>
       </p:par>
     </p:tnLst>
   </p:timing>
@@ -3680,7 +3680,7 @@
           <a:p>
             <a:fld id="{98F748B1-DC6F-4870-8D1C-AA1B251EDBCA}" type="datetimeFigureOut">
               <a:rPr lang="en-CA" smtClean="0"/>
-              <a:t>09/07/2014</a:t>
+              <a:t>2014-07-09</a:t>
             </a:fld>
             <a:endParaRPr lang="en-CA"/>
           </a:p>
@@ -3736,7 +3736,7 @@
   <p:timing>
     <p:tnLst>
       <p:par>
-        <p:cTn id="1" dur="indefinite" restart="never" nodeType="tmRoot"/>
+        <p:cTn xmlns:p14="http://schemas.microsoft.com/office/powerpoint/2010/main" id="1" dur="indefinite" restart="never" nodeType="tmRoot"/>
       </p:par>
     </p:tnLst>
   </p:timing>
@@ -4202,7 +4202,7 @@
           <a:p>
             <a:fld id="{98F748B1-DC6F-4870-8D1C-AA1B251EDBCA}" type="datetimeFigureOut">
               <a:rPr lang="en-CA" smtClean="0"/>
-              <a:t>09/07/2014</a:t>
+              <a:t>2014-07-09</a:t>
             </a:fld>
             <a:endParaRPr lang="en-CA"/>
           </a:p>
@@ -4292,7 +4292,7 @@
   <p:timing>
     <p:tnLst>
       <p:par>
-        <p:cTn id="1" dur="indefinite" restart="never" nodeType="tmRoot"/>
+        <p:cTn xmlns:p14="http://schemas.microsoft.com/office/powerpoint/2010/main" id="1" dur="indefinite" restart="never" nodeType="tmRoot"/>
       </p:par>
     </p:tnLst>
   </p:timing>
@@ -4722,7 +4722,7 @@
           <a:p>
             <a:fld id="{98F748B1-DC6F-4870-8D1C-AA1B251EDBCA}" type="datetimeFigureOut">
               <a:rPr lang="en-CA" smtClean="0"/>
-              <a:t>09/07/2014</a:t>
+              <a:t>2014-07-09</a:t>
             </a:fld>
             <a:endParaRPr lang="en-CA"/>
           </a:p>
@@ -4827,7 +4827,7 @@
   <p:timing>
     <p:tnLst>
       <p:par>
-        <p:cTn id="1" dur="indefinite" restart="never" nodeType="tmRoot"/>
+        <p:cTn xmlns:p14="http://schemas.microsoft.com/office/powerpoint/2010/main" id="1" dur="indefinite" restart="never" nodeType="tmRoot"/>
       </p:par>
     </p:tnLst>
   </p:timing>
@@ -5570,7 +5570,7 @@
   <p:timing>
     <p:tnLst>
       <p:par>
-        <p:cTn id="1" dur="indefinite" restart="never" nodeType="tmRoot"/>
+        <p:cTn xmlns:p14="http://schemas.microsoft.com/office/powerpoint/2010/main" id="1" dur="indefinite" restart="never" nodeType="tmRoot"/>
       </p:par>
     </p:tnLst>
   </p:timing>
@@ -5643,36 +5643,42 @@
         </p:spPr>
         <p:txBody>
           <a:bodyPr>
-            <a:normAutofit fontScale="92500"/>
+            <a:normAutofit fontScale="92500" lnSpcReduction="20000"/>
           </a:bodyPr>
           <a:lstStyle/>
           <a:p>
             <a:r>
-              <a:rPr lang="en-CA" dirty="0" smtClean="0"/>
+              <a:rPr lang="en-CA" dirty="0"/>
               <a:t>Sockets are used for communication between nodes.</a:t>
             </a:r>
           </a:p>
           <a:p>
             <a:r>
-              <a:rPr lang="en-CA" dirty="0" smtClean="0"/>
-              <a:t>Communication between nodes is asynchronous.</a:t>
-            </a:r>
-          </a:p>
-          <a:p>
-            <a:r>
-              <a:rPr lang="en-CA" dirty="0" smtClean="0"/>
-              <a:t>Multithreading used for creating sockets.</a:t>
-            </a:r>
-          </a:p>
-          <a:p>
-            <a:r>
-              <a:rPr lang="en-CA" dirty="0" smtClean="0"/>
+              <a:rPr lang="en-CA" dirty="0"/>
+              <a:t>Communication between servers is asynchronous.</a:t>
+            </a:r>
+          </a:p>
+          <a:p>
+            <a:r>
+              <a:rPr lang="en-CA" dirty="0"/>
+              <a:t>Communication between client and server is synchronous.</a:t>
+            </a:r>
+          </a:p>
+          <a:p>
+            <a:r>
+              <a:rPr lang="en-CA" dirty="0"/>
+              <a:t>Multithreading in server and single thread in client.</a:t>
+            </a:r>
+          </a:p>
+          <a:p>
+            <a:r>
+              <a:rPr lang="en-CA" dirty="0"/>
               <a:t>Client communicates with one server when accesses the same file.</a:t>
             </a:r>
           </a:p>
           <a:p>
             <a:r>
-              <a:rPr lang="en-CA" dirty="0" smtClean="0"/>
+              <a:rPr lang="en-CA" dirty="0"/>
               <a:t>One service server communicate with all other servers for message passing and only transfer data to backup servers.</a:t>
             </a:r>
           </a:p>
@@ -5800,14 +5806,14 @@
               <a:noFill/>
             </a:ln>
             <a:extLst>
-              <a:ext uri="{909E8E84-426E-40DD-AFC4-6F175D3DCCD1}">
+              <a:ext uri="{909E8E84-426E-40dd-AFC4-6F175D3DCCD1}">
                 <a14:hiddenFill xmlns:a14="http://schemas.microsoft.com/office/drawing/2010/main">
                   <a:solidFill>
                     <a:schemeClr val="accent1"/>
                   </a:solidFill>
                 </a14:hiddenFill>
               </a:ext>
-              <a:ext uri="{91240B29-F687-4F45-9708-019B960494DF}">
+              <a:ext uri="{91240B29-F687-4f45-9708-019B960494DF}">
                 <a14:hiddenLine xmlns:a14="http://schemas.microsoft.com/office/drawing/2010/main" w="9525">
                   <a:solidFill>
                     <a:schemeClr val="tx1"/>
@@ -5834,7 +5840,7 @@
   <p:timing>
     <p:tnLst>
       <p:par>
-        <p:cTn id="1" dur="indefinite" restart="never" nodeType="tmRoot"/>
+        <p:cTn xmlns:p14="http://schemas.microsoft.com/office/powerpoint/2010/main" id="1" dur="indefinite" restart="never" nodeType="tmRoot"/>
       </p:par>
     </p:tnLst>
   </p:timing>
@@ -5941,7 +5947,6 @@
               <a:rPr lang="en-CA" sz="2000" dirty="0"/>
               <a:t>Select service server to provide service according to both responding time and current work load of server.</a:t>
             </a:r>
-            <a:endParaRPr lang="en-CA" sz="2000" dirty="0"/>
           </a:p>
           <a:p>
             <a:pPr lvl="1"/>
@@ -6071,14 +6076,14 @@
               <a:noFill/>
             </a:ln>
             <a:extLst>
-              <a:ext uri="{909E8E84-426E-40DD-AFC4-6F175D3DCCD1}">
+              <a:ext uri="{909E8E84-426E-40dd-AFC4-6F175D3DCCD1}">
                 <a14:hiddenFill xmlns:a14="http://schemas.microsoft.com/office/drawing/2010/main">
                   <a:solidFill>
                     <a:schemeClr val="accent1"/>
                   </a:solidFill>
                 </a14:hiddenFill>
               </a:ext>
-              <a:ext uri="{91240B29-F687-4F45-9708-019B960494DF}">
+              <a:ext uri="{91240B29-F687-4f45-9708-019B960494DF}">
                 <a14:hiddenLine xmlns:a14="http://schemas.microsoft.com/office/drawing/2010/main" w="9525">
                   <a:solidFill>
                     <a:schemeClr val="tx1"/>
@@ -6105,7 +6110,7 @@
   <p:timing>
     <p:tnLst>
       <p:par>
-        <p:cTn id="1" dur="indefinite" restart="never" nodeType="tmRoot"/>
+        <p:cTn xmlns:p14="http://schemas.microsoft.com/office/powerpoint/2010/main" id="1" dur="indefinite" restart="never" nodeType="tmRoot"/>
       </p:par>
     </p:tnLst>
   </p:timing>
@@ -6280,7 +6285,6 @@
               <a:rPr lang="en-CA" dirty="0" smtClean="0"/>
               <a:t>/Git</a:t>
             </a:r>
-            <a:endParaRPr lang="en-CA" dirty="0" smtClean="0"/>
           </a:p>
           <a:p>
             <a:pPr marL="45720" indent="0">
@@ -6418,14 +6422,14 @@
               <a:noFill/>
             </a:ln>
             <a:extLst>
-              <a:ext uri="{909E8E84-426E-40DD-AFC4-6F175D3DCCD1}">
+              <a:ext uri="{909E8E84-426E-40dd-AFC4-6F175D3DCCD1}">
                 <a14:hiddenFill xmlns:a14="http://schemas.microsoft.com/office/drawing/2010/main">
                   <a:solidFill>
                     <a:schemeClr val="accent1"/>
                   </a:solidFill>
                 </a14:hiddenFill>
               </a:ext>
-              <a:ext uri="{91240B29-F687-4F45-9708-019B960494DF}">
+              <a:ext uri="{91240B29-F687-4f45-9708-019B960494DF}">
                 <a14:hiddenLine xmlns:a14="http://schemas.microsoft.com/office/drawing/2010/main" w="9525">
                   <a:solidFill>
                     <a:schemeClr val="tx1"/>
@@ -6452,7 +6456,7 @@
   <p:timing>
     <p:tnLst>
       <p:par>
-        <p:cTn id="1" dur="indefinite" restart="never" nodeType="tmRoot"/>
+        <p:cTn xmlns:p14="http://schemas.microsoft.com/office/powerpoint/2010/main" id="1" dur="indefinite" restart="never" nodeType="tmRoot"/>
       </p:par>
     </p:tnLst>
   </p:timing>
@@ -6583,14 +6587,14 @@
               <a:noFill/>
             </a:ln>
             <a:extLst>
-              <a:ext uri="{909E8E84-426E-40DD-AFC4-6F175D3DCCD1}">
+              <a:ext uri="{909E8E84-426E-40dd-AFC4-6F175D3DCCD1}">
                 <a14:hiddenFill xmlns:a14="http://schemas.microsoft.com/office/drawing/2010/main">
                   <a:solidFill>
                     <a:schemeClr val="accent1"/>
                   </a:solidFill>
                 </a14:hiddenFill>
               </a:ext>
-              <a:ext uri="{91240B29-F687-4F45-9708-019B960494DF}">
+              <a:ext uri="{91240B29-F687-4f45-9708-019B960494DF}">
                 <a14:hiddenLine xmlns:a14="http://schemas.microsoft.com/office/drawing/2010/main" w="9525">
                   <a:solidFill>
                     <a:schemeClr val="tx1"/>
@@ -6635,14 +6639,14 @@
               <a:noFill/>
             </a:ln>
             <a:extLst>
-              <a:ext uri="{909E8E84-426E-40DD-AFC4-6F175D3DCCD1}">
+              <a:ext uri="{909E8E84-426E-40dd-AFC4-6F175D3DCCD1}">
                 <a14:hiddenFill xmlns:a14="http://schemas.microsoft.com/office/drawing/2010/main">
                   <a:solidFill>
                     <a:schemeClr val="accent1"/>
                   </a:solidFill>
                 </a14:hiddenFill>
               </a:ext>
-              <a:ext uri="{91240B29-F687-4F45-9708-019B960494DF}">
+              <a:ext uri="{91240B29-F687-4f45-9708-019B960494DF}">
                 <a14:hiddenLine xmlns:a14="http://schemas.microsoft.com/office/drawing/2010/main" w="9525">
                   <a:solidFill>
                     <a:schemeClr val="tx1"/>
@@ -6778,14 +6782,14 @@
               <a:noFill/>
             </a:ln>
             <a:extLst>
-              <a:ext uri="{909E8E84-426E-40DD-AFC4-6F175D3DCCD1}">
+              <a:ext uri="{909E8E84-426E-40dd-AFC4-6F175D3DCCD1}">
                 <a14:hiddenFill xmlns:a14="http://schemas.microsoft.com/office/drawing/2010/main">
                   <a:solidFill>
                     <a:schemeClr val="accent1"/>
                   </a:solidFill>
                 </a14:hiddenFill>
               </a:ext>
-              <a:ext uri="{91240B29-F687-4F45-9708-019B960494DF}">
+              <a:ext uri="{91240B29-F687-4f45-9708-019B960494DF}">
                 <a14:hiddenLine xmlns:a14="http://schemas.microsoft.com/office/drawing/2010/main" w="9525">
                   <a:solidFill>
                     <a:schemeClr val="tx1"/>
@@ -6812,7 +6816,7 @@
   <p:timing>
     <p:tnLst>
       <p:par>
-        <p:cTn id="1" dur="indefinite" restart="never" nodeType="tmRoot"/>
+        <p:cTn xmlns:p14="http://schemas.microsoft.com/office/powerpoint/2010/main" id="1" dur="indefinite" restart="never" nodeType="tmRoot"/>
       </p:par>
     </p:tnLst>
   </p:timing>
@@ -6933,7 +6937,7 @@
         </p:nvGraphicFramePr>
         <p:xfrm>
           <a:off x="5010727" y="1286593"/>
-          <a:ext cx="4025769" cy="3983676"/>
+          <a:ext cx="4025769" cy="3983583"/>
         </p:xfrm>
         <a:graphic>
           <a:graphicData uri="http://schemas.openxmlformats.org/drawingml/2006/table">
@@ -8318,14 +8322,14 @@
           </a:ln>
           <a:effectLst/>
           <a:extLst>
-            <a:ext uri="{909E8E84-426E-40DD-AFC4-6F175D3DCCD1}">
+            <a:ext uri="{909E8E84-426E-40dd-AFC4-6F175D3DCCD1}">
               <a14:hiddenFill xmlns:a14="http://schemas.microsoft.com/office/drawing/2010/main">
                 <a:solidFill>
                   <a:schemeClr val="accent1"/>
                 </a:solidFill>
               </a14:hiddenFill>
             </a:ext>
-            <a:ext uri="{91240B29-F687-4F45-9708-019B960494DF}">
+            <a:ext uri="{91240B29-F687-4f45-9708-019B960494DF}">
               <a14:hiddenLine xmlns:a14="http://schemas.microsoft.com/office/drawing/2010/main" w="9525">
                 <a:solidFill>
                   <a:schemeClr val="tx1"/>
@@ -8335,7 +8339,7 @@
                 <a:tailEnd/>
               </a14:hiddenLine>
             </a:ext>
-            <a:ext uri="{AF507438-7753-43E0-B8FC-AC1667EBCBE1}">
+            <a:ext uri="{AF507438-7753-43e0-B8FC-AC1667EBCBE1}">
               <a14:hiddenEffects xmlns:a14="http://schemas.microsoft.com/office/drawing/2010/main">
                 <a:effectLst>
                   <a:outerShdw dist="35921" dir="2700000" algn="ctr" rotWithShape="0">
@@ -8507,14 +8511,14 @@
               <a:noFill/>
             </a:ln>
             <a:extLst>
-              <a:ext uri="{909E8E84-426E-40DD-AFC4-6F175D3DCCD1}">
+              <a:ext uri="{909E8E84-426E-40dd-AFC4-6F175D3DCCD1}">
                 <a14:hiddenFill xmlns:a14="http://schemas.microsoft.com/office/drawing/2010/main">
                   <a:solidFill>
                     <a:schemeClr val="accent1"/>
                   </a:solidFill>
                 </a14:hiddenFill>
               </a:ext>
-              <a:ext uri="{91240B29-F687-4F45-9708-019B960494DF}">
+              <a:ext uri="{91240B29-F687-4f45-9708-019B960494DF}">
                 <a14:hiddenLine xmlns:a14="http://schemas.microsoft.com/office/drawing/2010/main" w="9525">
                   <a:solidFill>
                     <a:schemeClr val="tx1"/>
@@ -8541,7 +8545,7 @@
   <p:timing>
     <p:tnLst>
       <p:par>
-        <p:cTn id="1" dur="indefinite" restart="never" nodeType="tmRoot"/>
+        <p:cTn xmlns:p14="http://schemas.microsoft.com/office/powerpoint/2010/main" id="1" dur="indefinite" restart="never" nodeType="tmRoot"/>
       </p:par>
     </p:tnLst>
   </p:timing>
@@ -8781,14 +8785,14 @@
               <a:noFill/>
             </a:ln>
             <a:extLst>
-              <a:ext uri="{909E8E84-426E-40DD-AFC4-6F175D3DCCD1}">
+              <a:ext uri="{909E8E84-426E-40dd-AFC4-6F175D3DCCD1}">
                 <a14:hiddenFill xmlns:a14="http://schemas.microsoft.com/office/drawing/2010/main">
                   <a:solidFill>
                     <a:schemeClr val="accent1"/>
                   </a:solidFill>
                 </a14:hiddenFill>
               </a:ext>
-              <a:ext uri="{91240B29-F687-4F45-9708-019B960494DF}">
+              <a:ext uri="{91240B29-F687-4f45-9708-019B960494DF}">
                 <a14:hiddenLine xmlns:a14="http://schemas.microsoft.com/office/drawing/2010/main" w="9525">
                   <a:solidFill>
                     <a:schemeClr val="tx1"/>
@@ -8815,7 +8819,7 @@
   <p:timing>
     <p:tnLst>
       <p:par>
-        <p:cTn id="1" dur="indefinite" restart="never" nodeType="tmRoot"/>
+        <p:cTn xmlns:p14="http://schemas.microsoft.com/office/powerpoint/2010/main" id="1" dur="indefinite" restart="never" nodeType="tmRoot"/>
       </p:par>
     </p:tnLst>
   </p:timing>
@@ -9096,14 +9100,14 @@
               <a:noFill/>
             </a:ln>
             <a:extLst>
-              <a:ext uri="{909E8E84-426E-40DD-AFC4-6F175D3DCCD1}">
+              <a:ext uri="{909E8E84-426E-40dd-AFC4-6F175D3DCCD1}">
                 <a14:hiddenFill xmlns:a14="http://schemas.microsoft.com/office/drawing/2010/main">
                   <a:solidFill>
                     <a:schemeClr val="accent1"/>
                   </a:solidFill>
                 </a14:hiddenFill>
               </a:ext>
-              <a:ext uri="{91240B29-F687-4F45-9708-019B960494DF}">
+              <a:ext uri="{91240B29-F687-4f45-9708-019B960494DF}">
                 <a14:hiddenLine xmlns:a14="http://schemas.microsoft.com/office/drawing/2010/main" w="9525">
                   <a:solidFill>
                     <a:schemeClr val="tx1"/>
@@ -9130,7 +9134,7 @@
   <p:timing>
     <p:tnLst>
       <p:par>
-        <p:cTn id="1" dur="indefinite" restart="never" nodeType="tmRoot"/>
+        <p:cTn xmlns:p14="http://schemas.microsoft.com/office/powerpoint/2010/main" id="1" dur="indefinite" restart="never" nodeType="tmRoot"/>
       </p:par>
     </p:tnLst>
   </p:timing>
@@ -9276,14 +9280,14 @@
           </a:ln>
           <a:effectLst/>
           <a:extLst>
-            <a:ext uri="{909E8E84-426E-40DD-AFC4-6F175D3DCCD1}">
+            <a:ext uri="{909E8E84-426E-40dd-AFC4-6F175D3DCCD1}">
               <a14:hiddenFill xmlns:a14="http://schemas.microsoft.com/office/drawing/2010/main">
                 <a:solidFill>
                   <a:schemeClr val="accent1"/>
                 </a:solidFill>
               </a14:hiddenFill>
             </a:ext>
-            <a:ext uri="{91240B29-F687-4F45-9708-019B960494DF}">
+            <a:ext uri="{91240B29-F687-4f45-9708-019B960494DF}">
               <a14:hiddenLine xmlns:a14="http://schemas.microsoft.com/office/drawing/2010/main" w="9525">
                 <a:solidFill>
                   <a:schemeClr val="tx1"/>
@@ -9293,7 +9297,7 @@
                 <a:tailEnd/>
               </a14:hiddenLine>
             </a:ext>
-            <a:ext uri="{AF507438-7753-43E0-B8FC-AC1667EBCBE1}">
+            <a:ext uri="{AF507438-7753-43e0-B8FC-AC1667EBCBE1}">
               <a14:hiddenEffects xmlns:a14="http://schemas.microsoft.com/office/drawing/2010/main">
                 <a:effectLst>
                   <a:outerShdw dist="35921" dir="2700000" algn="ctr" rotWithShape="0">
@@ -9427,14 +9431,14 @@
               <a:noFill/>
             </a:ln>
             <a:extLst>
-              <a:ext uri="{909E8E84-426E-40DD-AFC4-6F175D3DCCD1}">
+              <a:ext uri="{909E8E84-426E-40dd-AFC4-6F175D3DCCD1}">
                 <a14:hiddenFill xmlns:a14="http://schemas.microsoft.com/office/drawing/2010/main">
                   <a:solidFill>
                     <a:schemeClr val="accent1"/>
                   </a:solidFill>
                 </a14:hiddenFill>
               </a:ext>
-              <a:ext uri="{91240B29-F687-4F45-9708-019B960494DF}">
+              <a:ext uri="{91240B29-F687-4f45-9708-019B960494DF}">
                 <a14:hiddenLine xmlns:a14="http://schemas.microsoft.com/office/drawing/2010/main" w="9525">
                   <a:solidFill>
                     <a:schemeClr val="tx1"/>
@@ -9461,7 +9465,7 @@
   <p:timing>
     <p:tnLst>
       <p:par>
-        <p:cTn id="1" dur="indefinite" restart="never" nodeType="tmRoot"/>
+        <p:cTn xmlns:p14="http://schemas.microsoft.com/office/powerpoint/2010/main" id="1" dur="indefinite" restart="never" nodeType="tmRoot"/>
       </p:par>
     </p:tnLst>
   </p:timing>
@@ -9620,14 +9624,14 @@
           </a:ln>
           <a:effectLst/>
           <a:extLst>
-            <a:ext uri="{909E8E84-426E-40DD-AFC4-6F175D3DCCD1}">
+            <a:ext uri="{909E8E84-426E-40dd-AFC4-6F175D3DCCD1}">
               <a14:hiddenFill xmlns:a14="http://schemas.microsoft.com/office/drawing/2010/main">
                 <a:solidFill>
                   <a:schemeClr val="accent1"/>
                 </a:solidFill>
               </a14:hiddenFill>
             </a:ext>
-            <a:ext uri="{91240B29-F687-4F45-9708-019B960494DF}">
+            <a:ext uri="{91240B29-F687-4f45-9708-019B960494DF}">
               <a14:hiddenLine xmlns:a14="http://schemas.microsoft.com/office/drawing/2010/main" w="9525">
                 <a:solidFill>
                   <a:schemeClr val="tx1"/>
@@ -9637,7 +9641,7 @@
                 <a:tailEnd/>
               </a14:hiddenLine>
             </a:ext>
-            <a:ext uri="{AF507438-7753-43E0-B8FC-AC1667EBCBE1}">
+            <a:ext uri="{AF507438-7753-43e0-B8FC-AC1667EBCBE1}">
               <a14:hiddenEffects xmlns:a14="http://schemas.microsoft.com/office/drawing/2010/main">
                 <a:effectLst>
                   <a:outerShdw dist="35921" dir="2700000" algn="ctr" rotWithShape="0">
@@ -9771,14 +9775,14 @@
               <a:noFill/>
             </a:ln>
             <a:extLst>
-              <a:ext uri="{909E8E84-426E-40DD-AFC4-6F175D3DCCD1}">
+              <a:ext uri="{909E8E84-426E-40dd-AFC4-6F175D3DCCD1}">
                 <a14:hiddenFill xmlns:a14="http://schemas.microsoft.com/office/drawing/2010/main">
                   <a:solidFill>
                     <a:schemeClr val="accent1"/>
                   </a:solidFill>
                 </a14:hiddenFill>
               </a:ext>
-              <a:ext uri="{91240B29-F687-4F45-9708-019B960494DF}">
+              <a:ext uri="{91240B29-F687-4f45-9708-019B960494DF}">
                 <a14:hiddenLine xmlns:a14="http://schemas.microsoft.com/office/drawing/2010/main" w="9525">
                   <a:solidFill>
                     <a:schemeClr val="tx1"/>
@@ -9805,7 +9809,7 @@
   <p:timing>
     <p:tnLst>
       <p:par>
-        <p:cTn id="1" dur="indefinite" restart="never" nodeType="tmRoot"/>
+        <p:cTn xmlns:p14="http://schemas.microsoft.com/office/powerpoint/2010/main" id="1" dur="indefinite" restart="never" nodeType="tmRoot"/>
       </p:par>
     </p:tnLst>
   </p:timing>
@@ -10056,14 +10060,14 @@
               <a:noFill/>
             </a:ln>
             <a:extLst>
-              <a:ext uri="{909E8E84-426E-40DD-AFC4-6F175D3DCCD1}">
+              <a:ext uri="{909E8E84-426E-40dd-AFC4-6F175D3DCCD1}">
                 <a14:hiddenFill xmlns:a14="http://schemas.microsoft.com/office/drawing/2010/main">
                   <a:solidFill>
                     <a:schemeClr val="accent1"/>
                   </a:solidFill>
                 </a14:hiddenFill>
               </a:ext>
-              <a:ext uri="{91240B29-F687-4F45-9708-019B960494DF}">
+              <a:ext uri="{91240B29-F687-4f45-9708-019B960494DF}">
                 <a14:hiddenLine xmlns:a14="http://schemas.microsoft.com/office/drawing/2010/main" w="9525">
                   <a:solidFill>
                     <a:schemeClr val="tx1"/>
@@ -10090,7 +10094,7 @@
   <p:timing>
     <p:tnLst>
       <p:par>
-        <p:cTn id="1" dur="indefinite" restart="never" nodeType="tmRoot"/>
+        <p:cTn xmlns:p14="http://schemas.microsoft.com/office/powerpoint/2010/main" id="1" dur="indefinite" restart="never" nodeType="tmRoot"/>
       </p:par>
     </p:tnLst>
   </p:timing>
@@ -10311,14 +10315,14 @@
               <a:noFill/>
             </a:ln>
             <a:extLst>
-              <a:ext uri="{909E8E84-426E-40DD-AFC4-6F175D3DCCD1}">
+              <a:ext uri="{909E8E84-426E-40dd-AFC4-6F175D3DCCD1}">
                 <a14:hiddenFill xmlns:a14="http://schemas.microsoft.com/office/drawing/2010/main">
                   <a:solidFill>
                     <a:schemeClr val="accent1"/>
                   </a:solidFill>
                 </a14:hiddenFill>
               </a:ext>
-              <a:ext uri="{91240B29-F687-4F45-9708-019B960494DF}">
+              <a:ext uri="{91240B29-F687-4f45-9708-019B960494DF}">
                 <a14:hiddenLine xmlns:a14="http://schemas.microsoft.com/office/drawing/2010/main" w="9525">
                   <a:solidFill>
                     <a:schemeClr val="tx1"/>
@@ -10345,7 +10349,7 @@
   <p:timing>
     <p:tnLst>
       <p:par>
-        <p:cTn id="1" dur="indefinite" restart="never" nodeType="tmRoot"/>
+        <p:cTn xmlns:p14="http://schemas.microsoft.com/office/powerpoint/2010/main" id="1" dur="indefinite" restart="never" nodeType="tmRoot"/>
       </p:par>
     </p:tnLst>
   </p:timing>
@@ -10601,14 +10605,14 @@
               <a:noFill/>
             </a:ln>
             <a:extLst>
-              <a:ext uri="{909E8E84-426E-40DD-AFC4-6F175D3DCCD1}">
+              <a:ext uri="{909E8E84-426E-40dd-AFC4-6F175D3DCCD1}">
                 <a14:hiddenFill xmlns:a14="http://schemas.microsoft.com/office/drawing/2010/main">
                   <a:solidFill>
                     <a:schemeClr val="accent1"/>
                   </a:solidFill>
                 </a14:hiddenFill>
               </a:ext>
-              <a:ext uri="{91240B29-F687-4F45-9708-019B960494DF}">
+              <a:ext uri="{91240B29-F687-4f45-9708-019B960494DF}">
                 <a14:hiddenLine xmlns:a14="http://schemas.microsoft.com/office/drawing/2010/main" w="9525">
                   <a:solidFill>
                     <a:schemeClr val="tx1"/>
@@ -10635,7 +10639,7 @@
   <p:timing>
     <p:tnLst>
       <p:par>
-        <p:cTn id="1" dur="indefinite" restart="never" nodeType="tmRoot"/>
+        <p:cTn xmlns:p14="http://schemas.microsoft.com/office/powerpoint/2010/main" id="1" dur="indefinite" restart="never" nodeType="tmRoot"/>
       </p:par>
     </p:tnLst>
   </p:timing>
@@ -10894,14 +10898,14 @@
               <a:noFill/>
             </a:ln>
             <a:extLst>
-              <a:ext uri="{909E8E84-426E-40DD-AFC4-6F175D3DCCD1}">
+              <a:ext uri="{909E8E84-426E-40dd-AFC4-6F175D3DCCD1}">
                 <a14:hiddenFill xmlns:a14="http://schemas.microsoft.com/office/drawing/2010/main">
                   <a:solidFill>
                     <a:schemeClr val="accent1"/>
                   </a:solidFill>
                 </a14:hiddenFill>
               </a:ext>
-              <a:ext uri="{91240B29-F687-4F45-9708-019B960494DF}">
+              <a:ext uri="{91240B29-F687-4f45-9708-019B960494DF}">
                 <a14:hiddenLine xmlns:a14="http://schemas.microsoft.com/office/drawing/2010/main" w="9525">
                   <a:solidFill>
                     <a:schemeClr val="tx1"/>
@@ -10928,7 +10932,7 @@
   <p:timing>
     <p:tnLst>
       <p:par>
-        <p:cTn id="1" dur="indefinite" restart="never" nodeType="tmRoot"/>
+        <p:cTn xmlns:p14="http://schemas.microsoft.com/office/powerpoint/2010/main" id="1" dur="indefinite" restart="never" nodeType="tmRoot"/>
       </p:par>
     </p:tnLst>
   </p:timing>

</xml_diff>